<commit_message>
updated presentation and added some flavor to get started button
</commit_message>
<xml_diff>
--- a/documentation/presentations/White Volley Girls - Final Project Presentation (Season 2).pptx
+++ b/documentation/presentations/White Volley Girls - Final Project Presentation (Season 2).pptx
@@ -23,16 +23,18 @@
     <p:sldId id="268" r:id="rId18"/>
     <p:sldId id="269" r:id="rId19"/>
     <p:sldId id="270" r:id="rId20"/>
+    <p:sldId id="271" r:id="rId21"/>
+    <p:sldId id="272" r:id="rId22"/>
   </p:sldIdLst>
   <p:sldSz cy="6858000" cx="9144000"/>
   <p:notesSz cx="6858000" cy="2466975"/>
   <p:embeddedFontLst>
     <p:embeddedFont>
       <p:font typeface="Constantia"/>
-      <p:regular r:id="rId21"/>
-      <p:bold r:id="rId22"/>
-      <p:italic r:id="rId23"/>
-      <p:boldItalic r:id="rId24"/>
+      <p:regular r:id="rId23"/>
+      <p:bold r:id="rId24"/>
+      <p:italic r:id="rId25"/>
+      <p:boldItalic r:id="rId26"/>
     </p:embeddedFont>
   </p:embeddedFontLst>
   <p:defaultTextStyle>
@@ -1627,7 +1629,293 @@
       </p:grpSpPr>
       <p:sp>
         <p:nvSpPr>
-          <p:cNvPr id="145" name="Google Shape;145;p6:notes"/>
+          <p:cNvPr id="145" name="Google Shape;145;g23f9ac6a66d_0_0:notes"/>
+          <p:cNvSpPr/>
+          <p:nvPr>
+            <p:ph idx="2" type="sldImg"/>
+          </p:nvPr>
+        </p:nvSpPr>
+        <p:spPr>
+          <a:xfrm>
+            <a:off x="1414463" y="1162050"/>
+            <a:ext cx="4181400" cy="3136800"/>
+          </a:xfrm>
+          <a:custGeom>
+            <a:rect b="b" l="l" r="r" t="t"/>
+            <a:pathLst>
+              <a:path extrusionOk="0" h="120000" w="120000">
+                <a:moveTo>
+                  <a:pt x="0" y="0"/>
+                </a:moveTo>
+                <a:lnTo>
+                  <a:pt x="120000" y="0"/>
+                </a:lnTo>
+                <a:lnTo>
+                  <a:pt x="120000" y="120000"/>
+                </a:lnTo>
+                <a:lnTo>
+                  <a:pt x="0" y="120000"/>
+                </a:lnTo>
+                <a:close/>
+              </a:path>
+            </a:pathLst>
+          </a:custGeom>
+        </p:spPr>
+      </p:sp>
+      <p:sp>
+        <p:nvSpPr>
+          <p:cNvPr id="146" name="Google Shape;146;g23f9ac6a66d_0_0:notes"/>
+          <p:cNvSpPr txBox="1"/>
+          <p:nvPr>
+            <p:ph idx="1" type="body"/>
+          </p:nvPr>
+        </p:nvSpPr>
+        <p:spPr>
+          <a:xfrm>
+            <a:off x="701041" y="4473893"/>
+            <a:ext cx="5608200" cy="3660600"/>
+          </a:xfrm>
+          <a:prstGeom prst="rect">
+            <a:avLst/>
+          </a:prstGeom>
+        </p:spPr>
+        <p:txBody>
+          <a:bodyPr anchorCtr="0" anchor="t" bIns="46575" lIns="93150" spcFirstLastPara="1" rIns="93150" wrap="square" tIns="46575">
+            <a:noAutofit/>
+          </a:bodyPr>
+          <a:lstStyle/>
+          <a:p>
+            <a:pPr indent="0" lvl="0" marL="0" rtl="0" algn="l">
+              <a:spcBef>
+                <a:spcPts val="0"/>
+              </a:spcBef>
+              <a:spcAft>
+                <a:spcPts val="0"/>
+              </a:spcAft>
+              <a:buNone/>
+            </a:pPr>
+            <a:r>
+              <a:t/>
+            </a:r>
+            <a:endParaRPr/>
+          </a:p>
+        </p:txBody>
+      </p:sp>
+      <p:sp>
+        <p:nvSpPr>
+          <p:cNvPr id="147" name="Google Shape;147;g23f9ac6a66d_0_0:notes"/>
+          <p:cNvSpPr txBox="1"/>
+          <p:nvPr>
+            <p:ph idx="12" type="sldNum"/>
+          </p:nvPr>
+        </p:nvSpPr>
+        <p:spPr>
+          <a:xfrm>
+            <a:off x="3970939" y="8829967"/>
+            <a:ext cx="3037800" cy="466500"/>
+          </a:xfrm>
+          <a:prstGeom prst="rect">
+            <a:avLst/>
+          </a:prstGeom>
+        </p:spPr>
+        <p:txBody>
+          <a:bodyPr anchorCtr="0" anchor="b" bIns="46575" lIns="93150" spcFirstLastPara="1" rIns="93150" wrap="square" tIns="46575">
+            <a:noAutofit/>
+          </a:bodyPr>
+          <a:lstStyle/>
+          <a:p>
+            <a:pPr indent="0" lvl="0" marL="0" rtl="0" algn="r">
+              <a:spcBef>
+                <a:spcPts val="0"/>
+              </a:spcBef>
+              <a:spcAft>
+                <a:spcPts val="0"/>
+              </a:spcAft>
+              <a:buClr>
+                <a:srgbClr val="000000"/>
+              </a:buClr>
+              <a:buFont typeface="Arial"/>
+              <a:buNone/>
+            </a:pPr>
+            <a:fld id="{00000000-1234-1234-1234-123412341234}" type="slidenum">
+              <a:rPr lang="en-US"/>
+              <a:t>‹#›</a:t>
+            </a:fld>
+            <a:endParaRPr/>
+          </a:p>
+        </p:txBody>
+      </p:sp>
+    </p:spTree>
+  </p:cSld>
+  <p:clrMapOvr>
+    <a:masterClrMapping/>
+  </p:clrMapOvr>
+</p:notes>
+</file>
+
+<file path=ppt/notesSlides/notesSlide11.xml><?xml version="1.0" encoding="utf-8"?>
+<p:notes xmlns:a="http://schemas.openxmlformats.org/drawingml/2006/main" xmlns:r="http://schemas.openxmlformats.org/officeDocument/2006/relationships" xmlns:mc="http://schemas.openxmlformats.org/markup-compatibility/2006" xmlns:mv="urn:schemas-microsoft-com:mac:vml" xmlns:p="http://schemas.openxmlformats.org/presentationml/2006/main" xmlns:c="http://schemas.openxmlformats.org/drawingml/2006/chart" xmlns:dgm="http://schemas.openxmlformats.org/drawingml/2006/diagram" xmlns:o="urn:schemas-microsoft-com:office:office" xmlns:v="urn:schemas-microsoft-com:vml" xmlns:pvml="urn:schemas-microsoft-com:office:powerpoint" xmlns:com="http://schemas.openxmlformats.org/drawingml/2006/compatibility" xmlns:p14="http://schemas.microsoft.com/office/powerpoint/2010/main" xmlns:p15="http://schemas.microsoft.com/office/powerpoint/2012/main" xmlns:ahyp="http://schemas.microsoft.com/office/drawing/2018/hyperlinkcolor" showMasterPhAnim="0" showMasterSp="0">
+  <p:cSld>
+    <p:spTree>
+      <p:nvGrpSpPr>
+        <p:cNvPr id="155" name="Shape 155"/>
+        <p:cNvGrpSpPr/>
+        <p:nvPr/>
+      </p:nvGrpSpPr>
+      <p:grpSpPr>
+        <a:xfrm>
+          <a:off x="0" y="0"/>
+          <a:ext cx="0" cy="0"/>
+          <a:chOff x="0" y="0"/>
+          <a:chExt cx="0" cy="0"/>
+        </a:xfrm>
+      </p:grpSpPr>
+      <p:sp>
+        <p:nvSpPr>
+          <p:cNvPr id="156" name="Google Shape;156;g23f9ac6a66d_0_19:notes"/>
+          <p:cNvSpPr/>
+          <p:nvPr>
+            <p:ph idx="2" type="sldImg"/>
+          </p:nvPr>
+        </p:nvSpPr>
+        <p:spPr>
+          <a:xfrm>
+            <a:off x="1414463" y="1162050"/>
+            <a:ext cx="4181400" cy="3136800"/>
+          </a:xfrm>
+          <a:custGeom>
+            <a:rect b="b" l="l" r="r" t="t"/>
+            <a:pathLst>
+              <a:path extrusionOk="0" h="120000" w="120000">
+                <a:moveTo>
+                  <a:pt x="0" y="0"/>
+                </a:moveTo>
+                <a:lnTo>
+                  <a:pt x="120000" y="0"/>
+                </a:lnTo>
+                <a:lnTo>
+                  <a:pt x="120000" y="120000"/>
+                </a:lnTo>
+                <a:lnTo>
+                  <a:pt x="0" y="120000"/>
+                </a:lnTo>
+                <a:close/>
+              </a:path>
+            </a:pathLst>
+          </a:custGeom>
+        </p:spPr>
+      </p:sp>
+      <p:sp>
+        <p:nvSpPr>
+          <p:cNvPr id="157" name="Google Shape;157;g23f9ac6a66d_0_19:notes"/>
+          <p:cNvSpPr txBox="1"/>
+          <p:nvPr>
+            <p:ph idx="1" type="body"/>
+          </p:nvPr>
+        </p:nvSpPr>
+        <p:spPr>
+          <a:xfrm>
+            <a:off x="701041" y="4473893"/>
+            <a:ext cx="5608200" cy="3660600"/>
+          </a:xfrm>
+          <a:prstGeom prst="rect">
+            <a:avLst/>
+          </a:prstGeom>
+        </p:spPr>
+        <p:txBody>
+          <a:bodyPr anchorCtr="0" anchor="t" bIns="46575" lIns="93150" spcFirstLastPara="1" rIns="93150" wrap="square" tIns="46575">
+            <a:noAutofit/>
+          </a:bodyPr>
+          <a:lstStyle/>
+          <a:p>
+            <a:pPr indent="0" lvl="0" marL="0" rtl="0" algn="l">
+              <a:spcBef>
+                <a:spcPts val="0"/>
+              </a:spcBef>
+              <a:spcAft>
+                <a:spcPts val="0"/>
+              </a:spcAft>
+              <a:buNone/>
+            </a:pPr>
+            <a:r>
+              <a:t/>
+            </a:r>
+            <a:endParaRPr/>
+          </a:p>
+        </p:txBody>
+      </p:sp>
+      <p:sp>
+        <p:nvSpPr>
+          <p:cNvPr id="158" name="Google Shape;158;g23f9ac6a66d_0_19:notes"/>
+          <p:cNvSpPr txBox="1"/>
+          <p:nvPr>
+            <p:ph idx="12" type="sldNum"/>
+          </p:nvPr>
+        </p:nvSpPr>
+        <p:spPr>
+          <a:xfrm>
+            <a:off x="3970939" y="8829967"/>
+            <a:ext cx="3037800" cy="466500"/>
+          </a:xfrm>
+          <a:prstGeom prst="rect">
+            <a:avLst/>
+          </a:prstGeom>
+        </p:spPr>
+        <p:txBody>
+          <a:bodyPr anchorCtr="0" anchor="b" bIns="46575" lIns="93150" spcFirstLastPara="1" rIns="93150" wrap="square" tIns="46575">
+            <a:noAutofit/>
+          </a:bodyPr>
+          <a:lstStyle/>
+          <a:p>
+            <a:pPr indent="0" lvl="0" marL="0" rtl="0" algn="r">
+              <a:spcBef>
+                <a:spcPts val="0"/>
+              </a:spcBef>
+              <a:spcAft>
+                <a:spcPts val="0"/>
+              </a:spcAft>
+              <a:buClr>
+                <a:srgbClr val="000000"/>
+              </a:buClr>
+              <a:buFont typeface="Arial"/>
+              <a:buNone/>
+            </a:pPr>
+            <a:fld id="{00000000-1234-1234-1234-123412341234}" type="slidenum">
+              <a:rPr lang="en-US"/>
+              <a:t>‹#›</a:t>
+            </a:fld>
+            <a:endParaRPr/>
+          </a:p>
+        </p:txBody>
+      </p:sp>
+    </p:spTree>
+  </p:cSld>
+  <p:clrMapOvr>
+    <a:masterClrMapping/>
+  </p:clrMapOvr>
+</p:notes>
+</file>
+
+<file path=ppt/notesSlides/notesSlide12.xml><?xml version="1.0" encoding="utf-8"?>
+<p:notes xmlns:a="http://schemas.openxmlformats.org/drawingml/2006/main" xmlns:r="http://schemas.openxmlformats.org/officeDocument/2006/relationships" xmlns:mc="http://schemas.openxmlformats.org/markup-compatibility/2006" xmlns:mv="urn:schemas-microsoft-com:mac:vml" xmlns:p="http://schemas.openxmlformats.org/presentationml/2006/main" xmlns:c="http://schemas.openxmlformats.org/drawingml/2006/chart" xmlns:dgm="http://schemas.openxmlformats.org/drawingml/2006/diagram" xmlns:o="urn:schemas-microsoft-com:office:office" xmlns:v="urn:schemas-microsoft-com:vml" xmlns:pvml="urn:schemas-microsoft-com:office:powerpoint" xmlns:com="http://schemas.openxmlformats.org/drawingml/2006/compatibility" xmlns:p14="http://schemas.microsoft.com/office/powerpoint/2010/main" xmlns:p15="http://schemas.microsoft.com/office/powerpoint/2012/main" xmlns:ahyp="http://schemas.microsoft.com/office/drawing/2018/hyperlinkcolor" showMasterPhAnim="0" showMasterSp="0">
+  <p:cSld>
+    <p:spTree>
+      <p:nvGrpSpPr>
+        <p:cNvPr id="163" name="Shape 163"/>
+        <p:cNvGrpSpPr/>
+        <p:nvPr/>
+      </p:nvGrpSpPr>
+      <p:grpSpPr>
+        <a:xfrm>
+          <a:off x="0" y="0"/>
+          <a:ext cx="0" cy="0"/>
+          <a:chOff x="0" y="0"/>
+          <a:chExt cx="0" cy="0"/>
+        </a:xfrm>
+      </p:grpSpPr>
+      <p:sp>
+        <p:nvSpPr>
+          <p:cNvPr id="164" name="Google Shape;164;p6:notes"/>
           <p:cNvSpPr/>
           <p:nvPr>
             <p:ph idx="2" type="sldImg"/>
@@ -1672,7 +1960,7 @@
       </p:sp>
       <p:sp>
         <p:nvSpPr>
-          <p:cNvPr id="146" name="Google Shape;146;p6:notes"/>
+          <p:cNvPr id="165" name="Google Shape;165;p6:notes"/>
           <p:cNvSpPr txBox="1"/>
           <p:nvPr>
             <p:ph idx="1" type="body"/>
@@ -1715,7 +2003,7 @@
       </p:sp>
       <p:sp>
         <p:nvSpPr>
-          <p:cNvPr id="147" name="Google Shape;147;p6:notes"/>
+          <p:cNvPr id="166" name="Google Shape;166;p6:notes"/>
           <p:cNvSpPr txBox="1"/>
           <p:nvPr>
             <p:ph idx="12" type="sldNum"/>
@@ -1765,12 +2053,12 @@
 </p:notes>
 </file>
 
-<file path=ppt/notesSlides/notesSlide11.xml><?xml version="1.0" encoding="utf-8"?>
+<file path=ppt/notesSlides/notesSlide13.xml><?xml version="1.0" encoding="utf-8"?>
 <p:notes xmlns:a="http://schemas.openxmlformats.org/drawingml/2006/main" xmlns:r="http://schemas.openxmlformats.org/officeDocument/2006/relationships" xmlns:mc="http://schemas.openxmlformats.org/markup-compatibility/2006" xmlns:mv="urn:schemas-microsoft-com:mac:vml" xmlns:p="http://schemas.openxmlformats.org/presentationml/2006/main" xmlns:c="http://schemas.openxmlformats.org/drawingml/2006/chart" xmlns:dgm="http://schemas.openxmlformats.org/drawingml/2006/diagram" xmlns:o="urn:schemas-microsoft-com:office:office" xmlns:v="urn:schemas-microsoft-com:vml" xmlns:pvml="urn:schemas-microsoft-com:office:powerpoint" xmlns:com="http://schemas.openxmlformats.org/drawingml/2006/compatibility" xmlns:p14="http://schemas.microsoft.com/office/powerpoint/2010/main" xmlns:p15="http://schemas.microsoft.com/office/powerpoint/2012/main" xmlns:ahyp="http://schemas.microsoft.com/office/drawing/2018/hyperlinkcolor" showMasterPhAnim="0" showMasterSp="0">
   <p:cSld>
     <p:spTree>
       <p:nvGrpSpPr>
-        <p:cNvPr id="152" name="Shape 152"/>
+        <p:cNvPr id="171" name="Shape 171"/>
         <p:cNvGrpSpPr/>
         <p:nvPr/>
       </p:nvGrpSpPr>
@@ -1784,7 +2072,7 @@
       </p:grpSpPr>
       <p:sp>
         <p:nvSpPr>
-          <p:cNvPr id="153" name="Google Shape;153;p7:notes"/>
+          <p:cNvPr id="172" name="Google Shape;172;p7:notes"/>
           <p:cNvSpPr/>
           <p:nvPr>
             <p:ph idx="2" type="sldImg"/>
@@ -1829,7 +2117,7 @@
       </p:sp>
       <p:sp>
         <p:nvSpPr>
-          <p:cNvPr id="154" name="Google Shape;154;p7:notes"/>
+          <p:cNvPr id="173" name="Google Shape;173;p7:notes"/>
           <p:cNvSpPr txBox="1"/>
           <p:nvPr>
             <p:ph idx="1" type="body"/>
@@ -1872,7 +2160,7 @@
       </p:sp>
       <p:sp>
         <p:nvSpPr>
-          <p:cNvPr id="155" name="Google Shape;155;p7:notes"/>
+          <p:cNvPr id="174" name="Google Shape;174;p7:notes"/>
           <p:cNvSpPr txBox="1"/>
           <p:nvPr>
             <p:ph idx="12" type="sldNum"/>
@@ -1922,12 +2210,12 @@
 </p:notes>
 </file>
 
-<file path=ppt/notesSlides/notesSlide12.xml><?xml version="1.0" encoding="utf-8"?>
+<file path=ppt/notesSlides/notesSlide14.xml><?xml version="1.0" encoding="utf-8"?>
 <p:notes xmlns:a="http://schemas.openxmlformats.org/drawingml/2006/main" xmlns:r="http://schemas.openxmlformats.org/officeDocument/2006/relationships" xmlns:mc="http://schemas.openxmlformats.org/markup-compatibility/2006" xmlns:mv="urn:schemas-microsoft-com:mac:vml" xmlns:p="http://schemas.openxmlformats.org/presentationml/2006/main" xmlns:c="http://schemas.openxmlformats.org/drawingml/2006/chart" xmlns:dgm="http://schemas.openxmlformats.org/drawingml/2006/diagram" xmlns:o="urn:schemas-microsoft-com:office:office" xmlns:v="urn:schemas-microsoft-com:vml" xmlns:pvml="urn:schemas-microsoft-com:office:powerpoint" xmlns:com="http://schemas.openxmlformats.org/drawingml/2006/compatibility" xmlns:p14="http://schemas.microsoft.com/office/powerpoint/2010/main" xmlns:p15="http://schemas.microsoft.com/office/powerpoint/2012/main" xmlns:ahyp="http://schemas.microsoft.com/office/drawing/2018/hyperlinkcolor" showMasterPhAnim="0" showMasterSp="0">
   <p:cSld>
     <p:spTree>
       <p:nvGrpSpPr>
-        <p:cNvPr id="160" name="Shape 160"/>
+        <p:cNvPr id="179" name="Shape 179"/>
         <p:cNvGrpSpPr/>
         <p:nvPr/>
       </p:nvGrpSpPr>
@@ -1941,7 +2229,7 @@
       </p:grpSpPr>
       <p:sp>
         <p:nvSpPr>
-          <p:cNvPr id="161" name="Google Shape;161;p8:notes"/>
+          <p:cNvPr id="180" name="Google Shape;180;p8:notes"/>
           <p:cNvSpPr/>
           <p:nvPr>
             <p:ph idx="2" type="sldImg"/>
@@ -1986,7 +2274,7 @@
       </p:sp>
       <p:sp>
         <p:nvSpPr>
-          <p:cNvPr id="162" name="Google Shape;162;p8:notes"/>
+          <p:cNvPr id="181" name="Google Shape;181;p8:notes"/>
           <p:cNvSpPr txBox="1"/>
           <p:nvPr>
             <p:ph idx="1" type="body"/>
@@ -2029,7 +2317,7 @@
       </p:sp>
       <p:sp>
         <p:nvSpPr>
-          <p:cNvPr id="163" name="Google Shape;163;p8:notes"/>
+          <p:cNvPr id="182" name="Google Shape;182;p8:notes"/>
           <p:cNvSpPr txBox="1"/>
           <p:nvPr>
             <p:ph idx="12" type="sldNum"/>
@@ -2079,12 +2367,12 @@
 </p:notes>
 </file>
 
-<file path=ppt/notesSlides/notesSlide13.xml><?xml version="1.0" encoding="utf-8"?>
+<file path=ppt/notesSlides/notesSlide15.xml><?xml version="1.0" encoding="utf-8"?>
 <p:notes xmlns:a="http://schemas.openxmlformats.org/drawingml/2006/main" xmlns:r="http://schemas.openxmlformats.org/officeDocument/2006/relationships" xmlns:mc="http://schemas.openxmlformats.org/markup-compatibility/2006" xmlns:mv="urn:schemas-microsoft-com:mac:vml" xmlns:p="http://schemas.openxmlformats.org/presentationml/2006/main" xmlns:c="http://schemas.openxmlformats.org/drawingml/2006/chart" xmlns:dgm="http://schemas.openxmlformats.org/drawingml/2006/diagram" xmlns:o="urn:schemas-microsoft-com:office:office" xmlns:v="urn:schemas-microsoft-com:vml" xmlns:pvml="urn:schemas-microsoft-com:office:powerpoint" xmlns:com="http://schemas.openxmlformats.org/drawingml/2006/compatibility" xmlns:p14="http://schemas.microsoft.com/office/powerpoint/2010/main" xmlns:p15="http://schemas.microsoft.com/office/powerpoint/2012/main" xmlns:ahyp="http://schemas.microsoft.com/office/drawing/2018/hyperlinkcolor" showMasterPhAnim="0" showMasterSp="0">
   <p:cSld>
     <p:spTree>
       <p:nvGrpSpPr>
-        <p:cNvPr id="168" name="Shape 168"/>
+        <p:cNvPr id="187" name="Shape 187"/>
         <p:cNvGrpSpPr/>
         <p:nvPr/>
       </p:nvGrpSpPr>
@@ -2098,7 +2386,7 @@
       </p:grpSpPr>
       <p:sp>
         <p:nvSpPr>
-          <p:cNvPr id="169" name="Google Shape;169;p9:notes"/>
+          <p:cNvPr id="188" name="Google Shape;188;p9:notes"/>
           <p:cNvSpPr/>
           <p:nvPr>
             <p:ph idx="2" type="sldImg"/>
@@ -2143,7 +2431,7 @@
       </p:sp>
       <p:sp>
         <p:nvSpPr>
-          <p:cNvPr id="170" name="Google Shape;170;p9:notes"/>
+          <p:cNvPr id="189" name="Google Shape;189;p9:notes"/>
           <p:cNvSpPr txBox="1"/>
           <p:nvPr>
             <p:ph idx="1" type="body"/>
@@ -2186,7 +2474,7 @@
       </p:sp>
       <p:sp>
         <p:nvSpPr>
-          <p:cNvPr id="171" name="Google Shape;171;p9:notes"/>
+          <p:cNvPr id="190" name="Google Shape;190;p9:notes"/>
           <p:cNvSpPr txBox="1"/>
           <p:nvPr>
             <p:ph idx="12" type="sldNum"/>
@@ -2236,12 +2524,12 @@
 </p:notes>
 </file>
 
-<file path=ppt/notesSlides/notesSlide14.xml><?xml version="1.0" encoding="utf-8"?>
+<file path=ppt/notesSlides/notesSlide16.xml><?xml version="1.0" encoding="utf-8"?>
 <p:notes xmlns:a="http://schemas.openxmlformats.org/drawingml/2006/main" xmlns:r="http://schemas.openxmlformats.org/officeDocument/2006/relationships" xmlns:mc="http://schemas.openxmlformats.org/markup-compatibility/2006" xmlns:mv="urn:schemas-microsoft-com:mac:vml" xmlns:p="http://schemas.openxmlformats.org/presentationml/2006/main" xmlns:c="http://schemas.openxmlformats.org/drawingml/2006/chart" xmlns:dgm="http://schemas.openxmlformats.org/drawingml/2006/diagram" xmlns:o="urn:schemas-microsoft-com:office:office" xmlns:v="urn:schemas-microsoft-com:vml" xmlns:pvml="urn:schemas-microsoft-com:office:powerpoint" xmlns:com="http://schemas.openxmlformats.org/drawingml/2006/compatibility" xmlns:p14="http://schemas.microsoft.com/office/powerpoint/2010/main" xmlns:p15="http://schemas.microsoft.com/office/powerpoint/2012/main" xmlns:ahyp="http://schemas.microsoft.com/office/drawing/2018/hyperlinkcolor" showMasterPhAnim="0" showMasterSp="0">
   <p:cSld>
     <p:spTree>
       <p:nvGrpSpPr>
-        <p:cNvPr id="176" name="Shape 176"/>
+        <p:cNvPr id="195" name="Shape 195"/>
         <p:cNvGrpSpPr/>
         <p:nvPr/>
       </p:nvGrpSpPr>
@@ -2255,7 +2543,7 @@
       </p:grpSpPr>
       <p:sp>
         <p:nvSpPr>
-          <p:cNvPr id="177" name="Google Shape;177;g21eaea42d05_0_0:notes"/>
+          <p:cNvPr id="196" name="Google Shape;196;g21eaea42d05_0_0:notes"/>
           <p:cNvSpPr/>
           <p:nvPr>
             <p:ph idx="2" type="sldImg"/>
@@ -2300,7 +2588,7 @@
       </p:sp>
       <p:sp>
         <p:nvSpPr>
-          <p:cNvPr id="178" name="Google Shape;178;g21eaea42d05_0_0:notes"/>
+          <p:cNvPr id="197" name="Google Shape;197;g21eaea42d05_0_0:notes"/>
           <p:cNvSpPr txBox="1"/>
           <p:nvPr>
             <p:ph idx="1" type="body"/>
@@ -2343,7 +2631,7 @@
       </p:sp>
       <p:sp>
         <p:nvSpPr>
-          <p:cNvPr id="179" name="Google Shape;179;g21eaea42d05_0_0:notes"/>
+          <p:cNvPr id="198" name="Google Shape;198;g21eaea42d05_0_0:notes"/>
           <p:cNvSpPr txBox="1"/>
           <p:nvPr>
             <p:ph idx="12" type="sldNum"/>
@@ -2393,12 +2681,12 @@
 </p:notes>
 </file>
 
-<file path=ppt/notesSlides/notesSlide15.xml><?xml version="1.0" encoding="utf-8"?>
+<file path=ppt/notesSlides/notesSlide17.xml><?xml version="1.0" encoding="utf-8"?>
 <p:notes xmlns:a="http://schemas.openxmlformats.org/drawingml/2006/main" xmlns:r="http://schemas.openxmlformats.org/officeDocument/2006/relationships" xmlns:mc="http://schemas.openxmlformats.org/markup-compatibility/2006" xmlns:mv="urn:schemas-microsoft-com:mac:vml" xmlns:p="http://schemas.openxmlformats.org/presentationml/2006/main" xmlns:c="http://schemas.openxmlformats.org/drawingml/2006/chart" xmlns:dgm="http://schemas.openxmlformats.org/drawingml/2006/diagram" xmlns:o="urn:schemas-microsoft-com:office:office" xmlns:v="urn:schemas-microsoft-com:vml" xmlns:pvml="urn:schemas-microsoft-com:office:powerpoint" xmlns:com="http://schemas.openxmlformats.org/drawingml/2006/compatibility" xmlns:p14="http://schemas.microsoft.com/office/powerpoint/2010/main" xmlns:p15="http://schemas.microsoft.com/office/powerpoint/2012/main" xmlns:ahyp="http://schemas.microsoft.com/office/drawing/2018/hyperlinkcolor" showMasterPhAnim="0" showMasterSp="0">
   <p:cSld>
     <p:spTree>
       <p:nvGrpSpPr>
-        <p:cNvPr id="184" name="Shape 184"/>
+        <p:cNvPr id="203" name="Shape 203"/>
         <p:cNvGrpSpPr/>
         <p:nvPr/>
       </p:nvGrpSpPr>
@@ -2412,7 +2700,7 @@
       </p:grpSpPr>
       <p:sp>
         <p:nvSpPr>
-          <p:cNvPr id="185" name="Google Shape;185;p10:notes"/>
+          <p:cNvPr id="204" name="Google Shape;204;p10:notes"/>
           <p:cNvSpPr/>
           <p:nvPr>
             <p:ph idx="2" type="sldImg"/>
@@ -2457,7 +2745,7 @@
       </p:sp>
       <p:sp>
         <p:nvSpPr>
-          <p:cNvPr id="186" name="Google Shape;186;p10:notes"/>
+          <p:cNvPr id="205" name="Google Shape;205;p10:notes"/>
           <p:cNvSpPr txBox="1"/>
           <p:nvPr>
             <p:ph idx="1" type="body"/>
@@ -2500,7 +2788,7 @@
       </p:sp>
       <p:sp>
         <p:nvSpPr>
-          <p:cNvPr id="187" name="Google Shape;187;p10:notes"/>
+          <p:cNvPr id="206" name="Google Shape;206;p10:notes"/>
           <p:cNvSpPr txBox="1"/>
           <p:nvPr>
             <p:ph idx="12" type="sldNum"/>
@@ -9964,7 +10252,465 @@
       </p:grpSpPr>
       <p:pic>
         <p:nvPicPr>
-          <p:cNvPr descr="CSUN_Logo.png" id="149" name="Google Shape;149;p18"/>
+          <p:cNvPr id="149" name="Google Shape;149;p18"/>
+          <p:cNvPicPr preferRelativeResize="0"/>
+          <p:nvPr/>
+        </p:nvPicPr>
+        <p:blipFill>
+          <a:blip r:embed="rId3">
+            <a:alphaModFix/>
+          </a:blip>
+          <a:stretch>
+            <a:fillRect/>
+          </a:stretch>
+        </p:blipFill>
+        <p:spPr>
+          <a:xfrm>
+            <a:off x="0" y="0"/>
+            <a:ext cx="4272949" cy="3106478"/>
+          </a:xfrm>
+          <a:prstGeom prst="rect">
+            <a:avLst/>
+          </a:prstGeom>
+          <a:noFill/>
+          <a:ln>
+            <a:noFill/>
+          </a:ln>
+        </p:spPr>
+      </p:pic>
+      <p:pic>
+        <p:nvPicPr>
+          <p:cNvPr id="150" name="Google Shape;150;p18"/>
+          <p:cNvPicPr preferRelativeResize="0"/>
+          <p:nvPr/>
+        </p:nvPicPr>
+        <p:blipFill>
+          <a:blip r:embed="rId4">
+            <a:alphaModFix/>
+          </a:blip>
+          <a:stretch>
+            <a:fillRect/>
+          </a:stretch>
+        </p:blipFill>
+        <p:spPr>
+          <a:xfrm>
+            <a:off x="4871050" y="3760098"/>
+            <a:ext cx="4272949" cy="3097903"/>
+          </a:xfrm>
+          <a:prstGeom prst="rect">
+            <a:avLst/>
+          </a:prstGeom>
+          <a:noFill/>
+          <a:ln>
+            <a:noFill/>
+          </a:ln>
+        </p:spPr>
+      </p:pic>
+      <p:pic>
+        <p:nvPicPr>
+          <p:cNvPr id="151" name="Google Shape;151;p18"/>
+          <p:cNvPicPr preferRelativeResize="0"/>
+          <p:nvPr/>
+        </p:nvPicPr>
+        <p:blipFill>
+          <a:blip r:embed="rId5">
+            <a:alphaModFix/>
+          </a:blip>
+          <a:stretch>
+            <a:fillRect/>
+          </a:stretch>
+        </p:blipFill>
+        <p:spPr>
+          <a:xfrm>
+            <a:off x="4871059" y="0"/>
+            <a:ext cx="4272943" cy="3105751"/>
+          </a:xfrm>
+          <a:prstGeom prst="rect">
+            <a:avLst/>
+          </a:prstGeom>
+          <a:noFill/>
+          <a:ln>
+            <a:noFill/>
+          </a:ln>
+        </p:spPr>
+      </p:pic>
+      <p:sp>
+        <p:nvSpPr>
+          <p:cNvPr id="152" name="Google Shape;152;p18"/>
+          <p:cNvSpPr txBox="1"/>
+          <p:nvPr/>
+        </p:nvSpPr>
+        <p:spPr>
+          <a:xfrm>
+            <a:off x="4209150" y="1075125"/>
+            <a:ext cx="725700" cy="646500"/>
+          </a:xfrm>
+          <a:prstGeom prst="rect">
+            <a:avLst/>
+          </a:prstGeom>
+          <a:noFill/>
+          <a:ln>
+            <a:noFill/>
+          </a:ln>
+        </p:spPr>
+        <p:txBody>
+          <a:bodyPr anchorCtr="0" anchor="t" bIns="91425" lIns="91425" spcFirstLastPara="1" rIns="91425" wrap="square" tIns="91425">
+            <a:spAutoFit/>
+          </a:bodyPr>
+          <a:lstStyle/>
+          <a:p>
+            <a:pPr indent="0" lvl="0" marL="0" rtl="0" algn="l">
+              <a:spcBef>
+                <a:spcPts val="0"/>
+              </a:spcBef>
+              <a:spcAft>
+                <a:spcPts val="0"/>
+              </a:spcAft>
+              <a:buNone/>
+            </a:pPr>
+            <a:r>
+              <a:rPr lang="en-US" sz="3000">
+                <a:solidFill>
+                  <a:srgbClr val="FFFF00"/>
+                </a:solidFill>
+              </a:rPr>
+              <a:t>=&gt;</a:t>
+            </a:r>
+            <a:endParaRPr sz="3000">
+              <a:solidFill>
+                <a:srgbClr val="FFFF00"/>
+              </a:solidFill>
+            </a:endParaRPr>
+          </a:p>
+        </p:txBody>
+      </p:sp>
+      <p:sp>
+        <p:nvSpPr>
+          <p:cNvPr id="153" name="Google Shape;153;p18"/>
+          <p:cNvSpPr txBox="1"/>
+          <p:nvPr/>
+        </p:nvSpPr>
+        <p:spPr>
+          <a:xfrm>
+            <a:off x="392825" y="3901725"/>
+            <a:ext cx="3702000" cy="1639200"/>
+          </a:xfrm>
+          <a:prstGeom prst="rect">
+            <a:avLst/>
+          </a:prstGeom>
+          <a:noFill/>
+          <a:ln>
+            <a:noFill/>
+          </a:ln>
+        </p:spPr>
+        <p:txBody>
+          <a:bodyPr anchorCtr="0" anchor="t" bIns="91425" lIns="91425" spcFirstLastPara="1" rIns="91425" wrap="square" tIns="91425">
+            <a:spAutoFit/>
+          </a:bodyPr>
+          <a:lstStyle/>
+          <a:p>
+            <a:pPr indent="-317500" lvl="0" marL="457200" rtl="0" algn="l">
+              <a:lnSpc>
+                <a:spcPct val="115000"/>
+              </a:lnSpc>
+              <a:spcBef>
+                <a:spcPts val="0"/>
+              </a:spcBef>
+              <a:spcAft>
+                <a:spcPts val="0"/>
+              </a:spcAft>
+              <a:buClr>
+                <a:srgbClr val="FFFF00"/>
+              </a:buClr>
+              <a:buSzPts val="1400"/>
+              <a:buAutoNum type="arabicPeriod"/>
+            </a:pPr>
+            <a:r>
+              <a:rPr lang="en-US" u="sng">
+                <a:solidFill>
+                  <a:srgbClr val="FFFF00"/>
+                </a:solidFill>
+                <a:hlinkClick r:id="rId6">
+                  <a:extLst>
+                    <a:ext uri="{A12FA001-AC4F-418D-AE19-62706E023703}">
+                      <ahyp:hlinkClr val="tx"/>
+                    </a:ext>
+                  </a:extLst>
+                </a:hlinkClick>
+              </a:rPr>
+              <a:t>https://catalog.csun.edu/academics/comp/faculty/</a:t>
+            </a:r>
+            <a:endParaRPr>
+              <a:solidFill>
+                <a:srgbClr val="FFFF00"/>
+              </a:solidFill>
+            </a:endParaRPr>
+          </a:p>
+          <a:p>
+            <a:pPr indent="-317500" lvl="0" marL="457200" rtl="0" algn="l">
+              <a:lnSpc>
+                <a:spcPct val="115000"/>
+              </a:lnSpc>
+              <a:spcBef>
+                <a:spcPts val="0"/>
+              </a:spcBef>
+              <a:spcAft>
+                <a:spcPts val="0"/>
+              </a:spcAft>
+              <a:buClr>
+                <a:srgbClr val="FFFF00"/>
+              </a:buClr>
+              <a:buSzPts val="1400"/>
+              <a:buAutoNum type="arabicPeriod"/>
+            </a:pPr>
+            <a:r>
+              <a:rPr lang="en-US" u="sng">
+                <a:solidFill>
+                  <a:srgbClr val="FFFF00"/>
+                </a:solidFill>
+                <a:hlinkClick r:id="rId7">
+                  <a:extLst>
+                    <a:ext uri="{A12FA001-AC4F-418D-AE19-62706E023703}">
+                      <ahyp:hlinkClr val="tx"/>
+                    </a:ext>
+                  </a:extLst>
+                </a:hlinkClick>
+              </a:rPr>
+              <a:t>https://catalog.csun.edu/academics/comp/faculty/covington-richard/</a:t>
+            </a:r>
+            <a:endParaRPr>
+              <a:solidFill>
+                <a:srgbClr val="FFFF00"/>
+              </a:solidFill>
+            </a:endParaRPr>
+          </a:p>
+          <a:p>
+            <a:pPr indent="-317500" lvl="0" marL="457200" rtl="0" algn="l">
+              <a:lnSpc>
+                <a:spcPct val="115000"/>
+              </a:lnSpc>
+              <a:spcBef>
+                <a:spcPts val="0"/>
+              </a:spcBef>
+              <a:spcAft>
+                <a:spcPts val="0"/>
+              </a:spcAft>
+              <a:buClr>
+                <a:srgbClr val="FFFF00"/>
+              </a:buClr>
+              <a:buSzPts val="1400"/>
+              <a:buAutoNum type="arabicPeriod"/>
+            </a:pPr>
+            <a:r>
+              <a:rPr lang="en-US" u="sng">
+                <a:solidFill>
+                  <a:srgbClr val="FFFF00"/>
+                </a:solidFill>
+                <a:hlinkClick r:id="rId8">
+                  <a:extLst>
+                    <a:ext uri="{A12FA001-AC4F-418D-AE19-62706E023703}">
+                      <ahyp:hlinkClr val="tx"/>
+                    </a:ext>
+                  </a:extLst>
+                </a:hlinkClick>
+              </a:rPr>
+              <a:t>https://academics.csun.edu/faculty/rick.covington</a:t>
+            </a:r>
+            <a:endParaRPr>
+              <a:solidFill>
+                <a:srgbClr val="FFFF00"/>
+              </a:solidFill>
+            </a:endParaRPr>
+          </a:p>
+        </p:txBody>
+      </p:sp>
+      <p:sp>
+        <p:nvSpPr>
+          <p:cNvPr id="154" name="Google Shape;154;p18"/>
+          <p:cNvSpPr txBox="1"/>
+          <p:nvPr/>
+        </p:nvSpPr>
+        <p:spPr>
+          <a:xfrm rot="5400000">
+            <a:off x="6644675" y="3105750"/>
+            <a:ext cx="725700" cy="646500"/>
+          </a:xfrm>
+          <a:prstGeom prst="rect">
+            <a:avLst/>
+          </a:prstGeom>
+          <a:noFill/>
+          <a:ln>
+            <a:noFill/>
+          </a:ln>
+        </p:spPr>
+        <p:txBody>
+          <a:bodyPr anchorCtr="0" anchor="t" bIns="91425" lIns="91425" spcFirstLastPara="1" rIns="91425" wrap="square" tIns="91425">
+            <a:spAutoFit/>
+          </a:bodyPr>
+          <a:lstStyle/>
+          <a:p>
+            <a:pPr indent="0" lvl="0" marL="0" rtl="0" algn="l">
+              <a:spcBef>
+                <a:spcPts val="0"/>
+              </a:spcBef>
+              <a:spcAft>
+                <a:spcPts val="0"/>
+              </a:spcAft>
+              <a:buNone/>
+            </a:pPr>
+            <a:r>
+              <a:rPr lang="en-US" sz="3000">
+                <a:solidFill>
+                  <a:srgbClr val="FFFF00"/>
+                </a:solidFill>
+              </a:rPr>
+              <a:t>=&gt;</a:t>
+            </a:r>
+            <a:endParaRPr sz="3000">
+              <a:solidFill>
+                <a:srgbClr val="FFFF00"/>
+              </a:solidFill>
+            </a:endParaRPr>
+          </a:p>
+        </p:txBody>
+      </p:sp>
+    </p:spTree>
+  </p:cSld>
+  <p:clrMapOvr>
+    <a:masterClrMapping/>
+  </p:clrMapOvr>
+</p:sld>
+</file>
+
+<file path=ppt/slides/slide11.xml><?xml version="1.0" encoding="utf-8"?>
+<p:sld xmlns:a="http://schemas.openxmlformats.org/drawingml/2006/main" xmlns:r="http://schemas.openxmlformats.org/officeDocument/2006/relationships" xmlns:mc="http://schemas.openxmlformats.org/markup-compatibility/2006" xmlns:mv="urn:schemas-microsoft-com:mac:vml" xmlns:p="http://schemas.openxmlformats.org/presentationml/2006/main" xmlns:c="http://schemas.openxmlformats.org/drawingml/2006/chart" xmlns:dgm="http://schemas.openxmlformats.org/drawingml/2006/diagram" xmlns:o="urn:schemas-microsoft-com:office:office" xmlns:v="urn:schemas-microsoft-com:vml" xmlns:pvml="urn:schemas-microsoft-com:office:powerpoint" xmlns:com="http://schemas.openxmlformats.org/drawingml/2006/compatibility" xmlns:p14="http://schemas.microsoft.com/office/powerpoint/2010/main" xmlns:p15="http://schemas.microsoft.com/office/powerpoint/2012/main" xmlns:ahyp="http://schemas.microsoft.com/office/drawing/2018/hyperlinkcolor">
+  <p:cSld>
+    <p:spTree>
+      <p:nvGrpSpPr>
+        <p:cNvPr id="159" name="Shape 159"/>
+        <p:cNvGrpSpPr/>
+        <p:nvPr/>
+      </p:nvGrpSpPr>
+      <p:grpSpPr>
+        <a:xfrm>
+          <a:off x="0" y="0"/>
+          <a:ext cx="0" cy="0"/>
+          <a:chOff x="0" y="0"/>
+          <a:chExt cx="0" cy="0"/>
+        </a:xfrm>
+      </p:grpSpPr>
+      <p:pic>
+        <p:nvPicPr>
+          <p:cNvPr id="160" name="Google Shape;160;p19"/>
+          <p:cNvPicPr preferRelativeResize="0"/>
+          <p:nvPr/>
+        </p:nvPicPr>
+        <p:blipFill>
+          <a:blip r:embed="rId3">
+            <a:alphaModFix/>
+          </a:blip>
+          <a:stretch>
+            <a:fillRect/>
+          </a:stretch>
+        </p:blipFill>
+        <p:spPr>
+          <a:xfrm>
+            <a:off x="0" y="0"/>
+            <a:ext cx="9144003" cy="3321854"/>
+          </a:xfrm>
+          <a:prstGeom prst="rect">
+            <a:avLst/>
+          </a:prstGeom>
+          <a:noFill/>
+          <a:ln>
+            <a:noFill/>
+          </a:ln>
+        </p:spPr>
+      </p:pic>
+      <p:pic>
+        <p:nvPicPr>
+          <p:cNvPr id="161" name="Google Shape;161;p19"/>
+          <p:cNvPicPr preferRelativeResize="0"/>
+          <p:nvPr/>
+        </p:nvPicPr>
+        <p:blipFill>
+          <a:blip r:embed="rId4">
+            <a:alphaModFix/>
+          </a:blip>
+          <a:stretch>
+            <a:fillRect/>
+          </a:stretch>
+        </p:blipFill>
+        <p:spPr>
+          <a:xfrm>
+            <a:off x="119125" y="3429004"/>
+            <a:ext cx="4410075" cy="1581150"/>
+          </a:xfrm>
+          <a:prstGeom prst="rect">
+            <a:avLst/>
+          </a:prstGeom>
+          <a:noFill/>
+          <a:ln>
+            <a:noFill/>
+          </a:ln>
+        </p:spPr>
+      </p:pic>
+      <p:pic>
+        <p:nvPicPr>
+          <p:cNvPr id="162" name="Google Shape;162;p19"/>
+          <p:cNvPicPr preferRelativeResize="0"/>
+          <p:nvPr/>
+        </p:nvPicPr>
+        <p:blipFill>
+          <a:blip r:embed="rId5">
+            <a:alphaModFix/>
+          </a:blip>
+          <a:stretch>
+            <a:fillRect/>
+          </a:stretch>
+        </p:blipFill>
+        <p:spPr>
+          <a:xfrm>
+            <a:off x="5259300" y="3448054"/>
+            <a:ext cx="3113646" cy="1543046"/>
+          </a:xfrm>
+          <a:prstGeom prst="rect">
+            <a:avLst/>
+          </a:prstGeom>
+          <a:noFill/>
+          <a:ln>
+            <a:noFill/>
+          </a:ln>
+        </p:spPr>
+      </p:pic>
+    </p:spTree>
+  </p:cSld>
+  <p:clrMapOvr>
+    <a:masterClrMapping/>
+  </p:clrMapOvr>
+</p:sld>
+</file>
+
+<file path=ppt/slides/slide12.xml><?xml version="1.0" encoding="utf-8"?>
+<p:sld xmlns:a="http://schemas.openxmlformats.org/drawingml/2006/main" xmlns:r="http://schemas.openxmlformats.org/officeDocument/2006/relationships" xmlns:mc="http://schemas.openxmlformats.org/markup-compatibility/2006" xmlns:mv="urn:schemas-microsoft-com:mac:vml" xmlns:p="http://schemas.openxmlformats.org/presentationml/2006/main" xmlns:c="http://schemas.openxmlformats.org/drawingml/2006/chart" xmlns:dgm="http://schemas.openxmlformats.org/drawingml/2006/diagram" xmlns:o="urn:schemas-microsoft-com:office:office" xmlns:v="urn:schemas-microsoft-com:vml" xmlns:pvml="urn:schemas-microsoft-com:office:powerpoint" xmlns:com="http://schemas.openxmlformats.org/drawingml/2006/compatibility" xmlns:p14="http://schemas.microsoft.com/office/powerpoint/2010/main" xmlns:p15="http://schemas.microsoft.com/office/powerpoint/2012/main" xmlns:ahyp="http://schemas.microsoft.com/office/drawing/2018/hyperlinkcolor">
+  <p:cSld>
+    <p:spTree>
+      <p:nvGrpSpPr>
+        <p:cNvPr id="167" name="Shape 167"/>
+        <p:cNvGrpSpPr/>
+        <p:nvPr/>
+      </p:nvGrpSpPr>
+      <p:grpSpPr>
+        <a:xfrm>
+          <a:off x="0" y="0"/>
+          <a:ext cx="0" cy="0"/>
+          <a:chOff x="0" y="0"/>
+          <a:chExt cx="0" cy="0"/>
+        </a:xfrm>
+      </p:grpSpPr>
+      <p:pic>
+        <p:nvPicPr>
+          <p:cNvPr descr="CSUN_Logo.png" id="168" name="Google Shape;168;p20"/>
           <p:cNvPicPr preferRelativeResize="0"/>
           <p:nvPr/>
         </p:nvPicPr>
@@ -10014,7 +10760,7 @@
       </p:pic>
       <p:sp>
         <p:nvSpPr>
-          <p:cNvPr id="150" name="Google Shape;150;p18"/>
+          <p:cNvPr id="169" name="Google Shape;169;p20"/>
           <p:cNvSpPr/>
           <p:nvPr/>
         </p:nvSpPr>
@@ -10064,7 +10810,7 @@
       </p:sp>
       <p:sp>
         <p:nvSpPr>
-          <p:cNvPr id="151" name="Google Shape;151;p18"/>
+          <p:cNvPr id="170" name="Google Shape;170;p20"/>
           <p:cNvSpPr/>
           <p:nvPr/>
         </p:nvSpPr>
@@ -10466,12 +11212,12 @@
 </p:sld>
 </file>
 
-<file path=ppt/slides/slide11.xml><?xml version="1.0" encoding="utf-8"?>
+<file path=ppt/slides/slide13.xml><?xml version="1.0" encoding="utf-8"?>
 <p:sld xmlns:a="http://schemas.openxmlformats.org/drawingml/2006/main" xmlns:r="http://schemas.openxmlformats.org/officeDocument/2006/relationships" xmlns:mc="http://schemas.openxmlformats.org/markup-compatibility/2006" xmlns:mv="urn:schemas-microsoft-com:mac:vml" xmlns:p="http://schemas.openxmlformats.org/presentationml/2006/main" xmlns:c="http://schemas.openxmlformats.org/drawingml/2006/chart" xmlns:dgm="http://schemas.openxmlformats.org/drawingml/2006/diagram" xmlns:o="urn:schemas-microsoft-com:office:office" xmlns:v="urn:schemas-microsoft-com:vml" xmlns:pvml="urn:schemas-microsoft-com:office:powerpoint" xmlns:com="http://schemas.openxmlformats.org/drawingml/2006/compatibility" xmlns:p14="http://schemas.microsoft.com/office/powerpoint/2010/main" xmlns:p15="http://schemas.microsoft.com/office/powerpoint/2012/main" xmlns:ahyp="http://schemas.microsoft.com/office/drawing/2018/hyperlinkcolor">
   <p:cSld>
     <p:spTree>
       <p:nvGrpSpPr>
-        <p:cNvPr id="156" name="Shape 156"/>
+        <p:cNvPr id="175" name="Shape 175"/>
         <p:cNvGrpSpPr/>
         <p:nvPr/>
       </p:nvGrpSpPr>
@@ -10485,7 +11231,7 @@
       </p:grpSpPr>
       <p:pic>
         <p:nvPicPr>
-          <p:cNvPr descr="CSUN_Logo.png" id="157" name="Google Shape;157;p19"/>
+          <p:cNvPr descr="CSUN_Logo.png" id="176" name="Google Shape;176;p21"/>
           <p:cNvPicPr preferRelativeResize="0"/>
           <p:nvPr/>
         </p:nvPicPr>
@@ -10535,7 +11281,7 @@
       </p:pic>
       <p:sp>
         <p:nvSpPr>
-          <p:cNvPr id="158" name="Google Shape;158;p19"/>
+          <p:cNvPr id="177" name="Google Shape;177;p21"/>
           <p:cNvSpPr/>
           <p:nvPr/>
         </p:nvSpPr>
@@ -10593,7 +11339,7 @@
       </p:sp>
       <p:sp>
         <p:nvSpPr>
-          <p:cNvPr id="159" name="Google Shape;159;p19"/>
+          <p:cNvPr id="178" name="Google Shape;178;p21"/>
           <p:cNvSpPr/>
           <p:nvPr/>
         </p:nvSpPr>
@@ -11092,12 +11838,12 @@
 </p:sld>
 </file>
 
-<file path=ppt/slides/slide12.xml><?xml version="1.0" encoding="utf-8"?>
+<file path=ppt/slides/slide14.xml><?xml version="1.0" encoding="utf-8"?>
 <p:sld xmlns:a="http://schemas.openxmlformats.org/drawingml/2006/main" xmlns:r="http://schemas.openxmlformats.org/officeDocument/2006/relationships" xmlns:mc="http://schemas.openxmlformats.org/markup-compatibility/2006" xmlns:mv="urn:schemas-microsoft-com:mac:vml" xmlns:p="http://schemas.openxmlformats.org/presentationml/2006/main" xmlns:c="http://schemas.openxmlformats.org/drawingml/2006/chart" xmlns:dgm="http://schemas.openxmlformats.org/drawingml/2006/diagram" xmlns:o="urn:schemas-microsoft-com:office:office" xmlns:v="urn:schemas-microsoft-com:vml" xmlns:pvml="urn:schemas-microsoft-com:office:powerpoint" xmlns:com="http://schemas.openxmlformats.org/drawingml/2006/compatibility" xmlns:p14="http://schemas.microsoft.com/office/powerpoint/2010/main" xmlns:p15="http://schemas.microsoft.com/office/powerpoint/2012/main" xmlns:ahyp="http://schemas.microsoft.com/office/drawing/2018/hyperlinkcolor">
   <p:cSld>
     <p:spTree>
       <p:nvGrpSpPr>
-        <p:cNvPr id="164" name="Shape 164"/>
+        <p:cNvPr id="183" name="Shape 183"/>
         <p:cNvGrpSpPr/>
         <p:nvPr/>
       </p:nvGrpSpPr>
@@ -11111,7 +11857,7 @@
       </p:grpSpPr>
       <p:pic>
         <p:nvPicPr>
-          <p:cNvPr descr="CSUN_Logo.png" id="165" name="Google Shape;165;p20"/>
+          <p:cNvPr descr="CSUN_Logo.png" id="184" name="Google Shape;184;p22"/>
           <p:cNvPicPr preferRelativeResize="0"/>
           <p:nvPr/>
         </p:nvPicPr>
@@ -11161,7 +11907,7 @@
       </p:pic>
       <p:sp>
         <p:nvSpPr>
-          <p:cNvPr id="166" name="Google Shape;166;p20"/>
+          <p:cNvPr id="185" name="Google Shape;185;p22"/>
           <p:cNvSpPr/>
           <p:nvPr/>
         </p:nvSpPr>
@@ -11211,7 +11957,7 @@
       </p:sp>
       <p:sp>
         <p:nvSpPr>
-          <p:cNvPr id="167" name="Google Shape;167;p20"/>
+          <p:cNvPr id="186" name="Google Shape;186;p22"/>
           <p:cNvSpPr/>
           <p:nvPr/>
         </p:nvSpPr>
@@ -11449,12 +12195,12 @@
 </p:sld>
 </file>
 
-<file path=ppt/slides/slide13.xml><?xml version="1.0" encoding="utf-8"?>
+<file path=ppt/slides/slide15.xml><?xml version="1.0" encoding="utf-8"?>
 <p:sld xmlns:a="http://schemas.openxmlformats.org/drawingml/2006/main" xmlns:r="http://schemas.openxmlformats.org/officeDocument/2006/relationships" xmlns:mc="http://schemas.openxmlformats.org/markup-compatibility/2006" xmlns:mv="urn:schemas-microsoft-com:mac:vml" xmlns:p="http://schemas.openxmlformats.org/presentationml/2006/main" xmlns:c="http://schemas.openxmlformats.org/drawingml/2006/chart" xmlns:dgm="http://schemas.openxmlformats.org/drawingml/2006/diagram" xmlns:o="urn:schemas-microsoft-com:office:office" xmlns:v="urn:schemas-microsoft-com:vml" xmlns:pvml="urn:schemas-microsoft-com:office:powerpoint" xmlns:com="http://schemas.openxmlformats.org/drawingml/2006/compatibility" xmlns:p14="http://schemas.microsoft.com/office/powerpoint/2010/main" xmlns:p15="http://schemas.microsoft.com/office/powerpoint/2012/main" xmlns:ahyp="http://schemas.microsoft.com/office/drawing/2018/hyperlinkcolor">
   <p:cSld>
     <p:spTree>
       <p:nvGrpSpPr>
-        <p:cNvPr id="172" name="Shape 172"/>
+        <p:cNvPr id="191" name="Shape 191"/>
         <p:cNvGrpSpPr/>
         <p:nvPr/>
       </p:nvGrpSpPr>
@@ -11468,7 +12214,7 @@
       </p:grpSpPr>
       <p:pic>
         <p:nvPicPr>
-          <p:cNvPr descr="CSUN_Logo.png" id="173" name="Google Shape;173;p21"/>
+          <p:cNvPr descr="CSUN_Logo.png" id="192" name="Google Shape;192;p23"/>
           <p:cNvPicPr preferRelativeResize="0"/>
           <p:nvPr/>
         </p:nvPicPr>
@@ -11518,7 +12264,7 @@
       </p:pic>
       <p:sp>
         <p:nvSpPr>
-          <p:cNvPr id="174" name="Google Shape;174;p21"/>
+          <p:cNvPr id="193" name="Google Shape;193;p23"/>
           <p:cNvSpPr/>
           <p:nvPr/>
         </p:nvSpPr>
@@ -11564,7 +12310,7 @@
       </p:sp>
       <p:sp>
         <p:nvSpPr>
-          <p:cNvPr id="175" name="Google Shape;175;p21"/>
+          <p:cNvPr id="194" name="Google Shape;194;p23"/>
           <p:cNvSpPr/>
           <p:nvPr/>
         </p:nvSpPr>
@@ -12015,12 +12761,12 @@
 </p:sld>
 </file>
 
-<file path=ppt/slides/slide14.xml><?xml version="1.0" encoding="utf-8"?>
+<file path=ppt/slides/slide16.xml><?xml version="1.0" encoding="utf-8"?>
 <p:sld xmlns:a="http://schemas.openxmlformats.org/drawingml/2006/main" xmlns:r="http://schemas.openxmlformats.org/officeDocument/2006/relationships" xmlns:mc="http://schemas.openxmlformats.org/markup-compatibility/2006" xmlns:mv="urn:schemas-microsoft-com:mac:vml" xmlns:p="http://schemas.openxmlformats.org/presentationml/2006/main" xmlns:c="http://schemas.openxmlformats.org/drawingml/2006/chart" xmlns:dgm="http://schemas.openxmlformats.org/drawingml/2006/diagram" xmlns:o="urn:schemas-microsoft-com:office:office" xmlns:v="urn:schemas-microsoft-com:vml" xmlns:pvml="urn:schemas-microsoft-com:office:powerpoint" xmlns:com="http://schemas.openxmlformats.org/drawingml/2006/compatibility" xmlns:p14="http://schemas.microsoft.com/office/powerpoint/2010/main" xmlns:p15="http://schemas.microsoft.com/office/powerpoint/2012/main" xmlns:ahyp="http://schemas.microsoft.com/office/drawing/2018/hyperlinkcolor">
   <p:cSld>
     <p:spTree>
       <p:nvGrpSpPr>
-        <p:cNvPr id="180" name="Shape 180"/>
+        <p:cNvPr id="199" name="Shape 199"/>
         <p:cNvGrpSpPr/>
         <p:nvPr/>
       </p:nvGrpSpPr>
@@ -12034,7 +12780,7 @@
       </p:grpSpPr>
       <p:pic>
         <p:nvPicPr>
-          <p:cNvPr descr="CSUN_Logo.png" id="181" name="Google Shape;181;p22"/>
+          <p:cNvPr descr="CSUN_Logo.png" id="200" name="Google Shape;200;p24"/>
           <p:cNvPicPr preferRelativeResize="0"/>
           <p:nvPr/>
         </p:nvPicPr>
@@ -12084,7 +12830,7 @@
       </p:pic>
       <p:sp>
         <p:nvSpPr>
-          <p:cNvPr id="182" name="Google Shape;182;p22"/>
+          <p:cNvPr id="201" name="Google Shape;201;p24"/>
           <p:cNvSpPr/>
           <p:nvPr/>
         </p:nvSpPr>
@@ -12142,7 +12888,7 @@
       </p:sp>
       <p:sp>
         <p:nvSpPr>
-          <p:cNvPr id="183" name="Google Shape;183;p22"/>
+          <p:cNvPr id="202" name="Google Shape;202;p24"/>
           <p:cNvSpPr/>
           <p:nvPr/>
         </p:nvSpPr>
@@ -12374,21 +13120,9 @@
                 <a:cs typeface="Calibri"/>
                 <a:sym typeface="Calibri"/>
               </a:rPr>
-              <a:t>Since Flask doesn’t handle multiple requests at once, the database was never simultaneously queried </a:t>
-            </a:r>
-            <a:r>
-              <a:rPr b="1" i="1" lang="en-US" sz="1900">
-                <a:solidFill>
-                  <a:srgbClr val="FFFFFF"/>
-                </a:solidFill>
-                <a:latin typeface="Calibri"/>
-                <a:ea typeface="Calibri"/>
-                <a:cs typeface="Calibri"/>
-                <a:sym typeface="Calibri"/>
-              </a:rPr>
-              <a:t>(which in practice is supposed to be allowed to happen)</a:t>
-            </a:r>
-            <a:endParaRPr b="1" i="1" sz="1900">
+              <a:t>Since Flask doesn’t handle multiple requests at once, database connections weren’t pooled</a:t>
+            </a:r>
+            <a:endParaRPr b="1" sz="1900">
               <a:solidFill>
                 <a:srgbClr val="FFFFFF"/>
               </a:solidFill>
@@ -12399,6 +13133,67 @@
             </a:endParaRPr>
           </a:p>
           <a:p>
+            <a:pPr indent="-349250" lvl="2" marL="1371600" marR="0" rtl="0" algn="l">
+              <a:spcBef>
+                <a:spcPts val="0"/>
+              </a:spcBef>
+              <a:spcAft>
+                <a:spcPts val="0"/>
+              </a:spcAft>
+              <a:buClr>
+                <a:srgbClr val="FFFFFF"/>
+              </a:buClr>
+              <a:buSzPts val="1900"/>
+              <a:buFont typeface="Calibri"/>
+              <a:buChar char="■"/>
+            </a:pPr>
+            <a:r>
+              <a:rPr b="1" lang="en-US" sz="1900">
+                <a:solidFill>
+                  <a:srgbClr val="FFFFFF"/>
+                </a:solidFill>
+                <a:latin typeface="Calibri"/>
+                <a:ea typeface="Calibri"/>
+                <a:cs typeface="Calibri"/>
+                <a:sym typeface="Calibri"/>
+              </a:rPr>
+              <a:t>Meaning only one connection to the DB was </a:t>
+            </a:r>
+            <a:r>
+              <a:rPr b="1" lang="en-US" sz="1900">
+                <a:solidFill>
+                  <a:srgbClr val="FFFFFF"/>
+                </a:solidFill>
+                <a:latin typeface="Calibri"/>
+                <a:ea typeface="Calibri"/>
+                <a:cs typeface="Calibri"/>
+                <a:sym typeface="Calibri"/>
+              </a:rPr>
+              <a:t>maintained</a:t>
+            </a:r>
+            <a:r>
+              <a:rPr b="1" lang="en-US" sz="1900">
+                <a:solidFill>
+                  <a:srgbClr val="FFFFFF"/>
+                </a:solidFill>
+                <a:latin typeface="Calibri"/>
+                <a:ea typeface="Calibri"/>
+                <a:cs typeface="Calibri"/>
+                <a:sym typeface="Calibri"/>
+              </a:rPr>
+              <a:t> at all times</a:t>
+            </a:r>
+            <a:endParaRPr b="1" sz="1900">
+              <a:solidFill>
+                <a:srgbClr val="FFFFFF"/>
+              </a:solidFill>
+              <a:latin typeface="Calibri"/>
+              <a:ea typeface="Calibri"/>
+              <a:cs typeface="Calibri"/>
+              <a:sym typeface="Calibri"/>
+            </a:endParaRPr>
+          </a:p>
+          <a:p>
             <a:pPr indent="-349250" lvl="1" marL="914400" marR="0" rtl="0" algn="l">
               <a:spcBef>
                 <a:spcPts val="0"/>
@@ -12437,7 +13232,7 @@
               </a:rPr>
               <a:t>5000 asynchronous requests (FastAPI)</a:t>
             </a:r>
-            <a:endParaRPr b="1" sz="1900" u="sng">
+            <a:endParaRPr b="1" sz="1900">
               <a:solidFill>
                 <a:srgbClr val="FFFFFF"/>
               </a:solidFill>
@@ -12457,12 +13252,12 @@
 </p:sld>
 </file>
 
-<file path=ppt/slides/slide15.xml><?xml version="1.0" encoding="utf-8"?>
+<file path=ppt/slides/slide17.xml><?xml version="1.0" encoding="utf-8"?>
 <p:sld xmlns:a="http://schemas.openxmlformats.org/drawingml/2006/main" xmlns:r="http://schemas.openxmlformats.org/officeDocument/2006/relationships" xmlns:mc="http://schemas.openxmlformats.org/markup-compatibility/2006" xmlns:mv="urn:schemas-microsoft-com:mac:vml" xmlns:p="http://schemas.openxmlformats.org/presentationml/2006/main" xmlns:c="http://schemas.openxmlformats.org/drawingml/2006/chart" xmlns:dgm="http://schemas.openxmlformats.org/drawingml/2006/diagram" xmlns:o="urn:schemas-microsoft-com:office:office" xmlns:v="urn:schemas-microsoft-com:vml" xmlns:pvml="urn:schemas-microsoft-com:office:powerpoint" xmlns:com="http://schemas.openxmlformats.org/drawingml/2006/compatibility" xmlns:p14="http://schemas.microsoft.com/office/powerpoint/2010/main" xmlns:p15="http://schemas.microsoft.com/office/powerpoint/2012/main" xmlns:ahyp="http://schemas.microsoft.com/office/drawing/2018/hyperlinkcolor">
   <p:cSld>
     <p:spTree>
       <p:nvGrpSpPr>
-        <p:cNvPr id="188" name="Shape 188"/>
+        <p:cNvPr id="207" name="Shape 207"/>
         <p:cNvGrpSpPr/>
         <p:nvPr/>
       </p:nvGrpSpPr>
@@ -12476,7 +13271,7 @@
       </p:grpSpPr>
       <p:pic>
         <p:nvPicPr>
-          <p:cNvPr descr="CSUN_Logo.png" id="189" name="Google Shape;189;p23"/>
+          <p:cNvPr descr="CSUN_Logo.png" id="208" name="Google Shape;208;p25"/>
           <p:cNvPicPr preferRelativeResize="0"/>
           <p:nvPr/>
         </p:nvPicPr>
@@ -12526,7 +13321,7 @@
       </p:pic>
       <p:sp>
         <p:nvSpPr>
-          <p:cNvPr id="190" name="Google Shape;190;p23"/>
+          <p:cNvPr id="209" name="Google Shape;209;p25"/>
           <p:cNvSpPr/>
           <p:nvPr/>
         </p:nvSpPr>
@@ -12542,6 +13337,13 @@
           <a:ln>
             <a:noFill/>
           </a:ln>
+          <a:effectLst>
+            <a:outerShdw blurRad="57150" rotWithShape="0" algn="bl" dir="5400000" dist="19050">
+              <a:srgbClr val="000000">
+                <a:alpha val="50000"/>
+              </a:srgbClr>
+            </a:outerShdw>
+          </a:effectLst>
         </p:spPr>
         <p:txBody>
           <a:bodyPr anchorCtr="0" anchor="ctr" bIns="45700" lIns="91425" spcFirstLastPara="1" rIns="91425" wrap="square" tIns="45700">
@@ -12575,7 +13377,7 @@
       </p:sp>
       <p:sp>
         <p:nvSpPr>
-          <p:cNvPr id="191" name="Google Shape;191;p23"/>
+          <p:cNvPr id="210" name="Google Shape;210;p25"/>
           <p:cNvSpPr/>
           <p:nvPr/>
         </p:nvSpPr>
@@ -12617,7 +13419,15 @@
                 <a:cs typeface="Arial"/>
                 <a:sym typeface="Arial"/>
               </a:rPr>
-              <a:t>Questions?</a:t>
+              <a:t>Q</a:t>
+            </a:r>
+            <a:r>
+              <a:rPr b="1" lang="en-US" sz="3800">
+                <a:solidFill>
+                  <a:srgbClr val="D00D2D"/>
+                </a:solidFill>
+              </a:rPr>
+              <a:t>/A</a:t>
             </a:r>
             <a:endParaRPr b="1" sz="2400">
               <a:solidFill>
@@ -12748,21 +13558,22 @@
       </p:sp>
       <p:pic>
         <p:nvPicPr>
-          <p:cNvPr descr="Question mark on green pastel background" id="192" name="Google Shape;192;p23"/>
+          <p:cNvPr id="211" name="Google Shape;211;p25"/>
           <p:cNvPicPr preferRelativeResize="0"/>
           <p:nvPr/>
         </p:nvPicPr>
-        <p:blipFill rotWithShape="1">
+        <p:blipFill>
           <a:blip r:embed="rId4">
             <a:alphaModFix/>
           </a:blip>
-          <a:srcRect b="0" l="0" r="0" t="0"/>
-          <a:stretch/>
+          <a:stretch>
+            <a:fillRect/>
+          </a:stretch>
         </p:blipFill>
         <p:spPr>
           <a:xfrm>
-            <a:off x="0" y="1795347"/>
-            <a:ext cx="9144000" cy="3919312"/>
+            <a:off x="0" y="1730101"/>
+            <a:ext cx="9144001" cy="3901713"/>
           </a:xfrm>
           <a:prstGeom prst="rect">
             <a:avLst/>
@@ -12771,6 +13582,14 @@
           <a:ln>
             <a:noFill/>
           </a:ln>
+          <a:effectLst>
+            <a:outerShdw blurRad="1428750" rotWithShape="0" algn="bl" dist="19050">
+              <a:srgbClr val="FFFFFF">
+                <a:alpha val="62000"/>
+              </a:srgbClr>
+            </a:outerShdw>
+            <a:reflection blurRad="0" dir="5400000" dist="38100" endA="0" endPos="30000" fadeDir="5400012" kx="0" rotWithShape="0" algn="bl" stA="61000" stPos="0" sy="-100000" ky="0"/>
+          </a:effectLst>
         </p:spPr>
       </p:pic>
     </p:spTree>
@@ -12956,7 +13775,11 @@
             </a:pPr>
             <a:r>
               <a:rPr b="1" lang="en-US" sz="2100"/>
-              <a:t>Problem Definition</a:t>
+              <a:t>Solution</a:t>
+            </a:r>
+            <a:r>
+              <a:rPr b="1" lang="en-US" sz="2100"/>
+              <a:t> Definition</a:t>
             </a:r>
             <a:endParaRPr b="1" sz="2100"/>
           </a:p>
@@ -13085,7 +13908,7 @@
             </a:pPr>
             <a:r>
               <a:rPr b="1" lang="en-US" sz="2100"/>
-              <a:t>Questions</a:t>
+              <a:t>Q/A</a:t>
             </a:r>
             <a:endParaRPr/>
           </a:p>
@@ -13548,7 +14371,7 @@
                   <a:srgbClr val="FFFFFF"/>
                 </a:solidFill>
               </a:rPr>
-              <a:t>There exists portions of information that conflict</a:t>
+              <a:t>Some information simply hard to come by</a:t>
             </a:r>
             <a:endParaRPr b="1" sz="2200">
               <a:solidFill>
@@ -13576,7 +14399,7 @@
                   <a:srgbClr val="FFFFFF"/>
                 </a:solidFill>
               </a:rPr>
-              <a:t>Section information (i.e. enrollment count) differs in CSUN API and in the Registration Portal</a:t>
+              <a:t>Most notably, faculty information</a:t>
             </a:r>
             <a:endParaRPr b="1" sz="2200">
               <a:solidFill>
@@ -13585,6 +14408,81 @@
             </a:endParaRPr>
           </a:p>
           <a:p>
+            <a:pPr indent="-368300" lvl="2" marL="1371600" rtl="0" algn="l">
+              <a:spcBef>
+                <a:spcPts val="0"/>
+              </a:spcBef>
+              <a:spcAft>
+                <a:spcPts val="0"/>
+              </a:spcAft>
+              <a:buClr>
+                <a:srgbClr val="FFFF00"/>
+              </a:buClr>
+              <a:buSzPts val="2200"/>
+              <a:buChar char="■"/>
+            </a:pPr>
+            <a:r>
+              <a:rPr b="1" i="1" lang="en-US" sz="2200">
+                <a:solidFill>
+                  <a:srgbClr val="FFFF00"/>
+                </a:solidFill>
+              </a:rPr>
+              <a:t>More on this later…</a:t>
+            </a:r>
+            <a:endParaRPr b="1" i="1" sz="2200">
+              <a:solidFill>
+                <a:srgbClr val="FFFF00"/>
+              </a:solidFill>
+            </a:endParaRPr>
+          </a:p>
+          <a:p>
+            <a:pPr indent="0" lvl="0" marL="0" rtl="0" algn="l">
+              <a:spcBef>
+                <a:spcPts val="0"/>
+              </a:spcBef>
+              <a:spcAft>
+                <a:spcPts val="0"/>
+              </a:spcAft>
+              <a:buNone/>
+            </a:pPr>
+            <a:r>
+              <a:t/>
+            </a:r>
+            <a:endParaRPr b="1" sz="2200">
+              <a:solidFill>
+                <a:srgbClr val="FFFFFF"/>
+              </a:solidFill>
+            </a:endParaRPr>
+          </a:p>
+          <a:p>
+            <a:pPr indent="-368300" lvl="0" marL="457200" rtl="0" algn="l">
+              <a:spcBef>
+                <a:spcPts val="0"/>
+              </a:spcBef>
+              <a:spcAft>
+                <a:spcPts val="0"/>
+              </a:spcAft>
+              <a:buClr>
+                <a:srgbClr val="FFFFFF"/>
+              </a:buClr>
+              <a:buSzPts val="2200"/>
+              <a:buChar char="●"/>
+            </a:pPr>
+            <a:r>
+              <a:rPr b="1" lang="en-US" sz="2200">
+                <a:solidFill>
+                  <a:srgbClr val="FFFFFF"/>
+                </a:solidFill>
+              </a:rPr>
+              <a:t>There exists portions of information that conflict</a:t>
+            </a:r>
+            <a:endParaRPr b="1" sz="2200">
+              <a:solidFill>
+                <a:srgbClr val="FFFFFF"/>
+              </a:solidFill>
+            </a:endParaRPr>
+          </a:p>
+          <a:p>
             <a:pPr indent="-368300" lvl="1" marL="914400" rtl="0" algn="l">
               <a:spcBef>
                 <a:spcPts val="0"/>
@@ -13599,12 +14497,36 @@
               <a:buChar char="○"/>
             </a:pPr>
             <a:r>
+              <a:rPr b="1" lang="en-US" sz="2200"/>
+              <a:t>Catalog information (in Portal vs csun.edu) not consistent</a:t>
+            </a:r>
+            <a:endParaRPr b="1" sz="2200">
+              <a:solidFill>
+                <a:srgbClr val="FFFFFF"/>
+              </a:solidFill>
+            </a:endParaRPr>
+          </a:p>
+          <a:p>
+            <a:pPr indent="-368300" lvl="1" marL="914400" rtl="0" algn="l">
+              <a:spcBef>
+                <a:spcPts val="0"/>
+              </a:spcBef>
+              <a:spcAft>
+                <a:spcPts val="0"/>
+              </a:spcAft>
+              <a:buClr>
+                <a:srgbClr val="FFFFFF"/>
+              </a:buClr>
+              <a:buSzPts val="2200"/>
+              <a:buChar char="○"/>
+            </a:pPr>
+            <a:r>
               <a:rPr b="1" lang="en-US" sz="2200">
                 <a:solidFill>
                   <a:srgbClr val="FFFFFF"/>
                 </a:solidFill>
               </a:rPr>
-              <a:t>Catalog information (in Portal vs csun.edu) not consistent</a:t>
+              <a:t>Section information (i.e. enrollment count) differs in CSUN API and in the Registration Portal</a:t>
             </a:r>
             <a:endParaRPr b="1" sz="2200">
               <a:solidFill>
@@ -14057,12 +14979,20 @@
                 <a:solidFill>
                   <a:srgbClr val="D00D2D"/>
                 </a:solidFill>
+              </a:rPr>
+              <a:t>Solution </a:t>
+            </a:r>
+            <a:r>
+              <a:rPr b="1" lang="en-US" sz="3600">
+                <a:solidFill>
+                  <a:srgbClr val="D00D2D"/>
+                </a:solidFill>
                 <a:latin typeface="Arial"/>
                 <a:ea typeface="Arial"/>
                 <a:cs typeface="Arial"/>
                 <a:sym typeface="Arial"/>
               </a:rPr>
-              <a:t>Problem Definition</a:t>
+              <a:t>Definition</a:t>
             </a:r>
             <a:endParaRPr/>
           </a:p>
@@ -14653,18 +15583,14 @@
             </a:endParaRPr>
           </a:p>
           <a:p>
-            <a:pPr indent="-368300" lvl="0" marL="457200" rtl="0" algn="l">
-              <a:spcBef>
-                <a:spcPts val="0"/>
-              </a:spcBef>
-              <a:spcAft>
-                <a:spcPts val="0"/>
-              </a:spcAft>
-              <a:buClr>
-                <a:srgbClr val="FFFF00"/>
-              </a:buClr>
-              <a:buSzPts val="2200"/>
-              <a:buAutoNum type="arabicPeriod"/>
+            <a:pPr indent="0" lvl="0" marL="457200" rtl="0" algn="l">
+              <a:spcBef>
+                <a:spcPts val="0"/>
+              </a:spcBef>
+              <a:spcAft>
+                <a:spcPts val="0"/>
+              </a:spcAft>
+              <a:buNone/>
             </a:pPr>
             <a:r>
               <a:rPr b="1" lang="en-US" sz="2200">
@@ -14688,7 +15614,7 @@
                   <a:srgbClr val="FFFF00"/>
                 </a:solidFill>
               </a:rPr>
-              <a:t> keeping information that the consumer (students) sees as accurate as possible</a:t>
+              <a:t> keeping information that the stakeholder (students) sees as accurate as possible</a:t>
             </a:r>
             <a:endParaRPr b="1" sz="2200">
               <a:solidFill>
@@ -15949,7 +16875,7 @@
                 <a:cs typeface="Calibri"/>
                 <a:sym typeface="Calibri"/>
               </a:rPr>
-              <a:t>On our Ubuntu Server machine, created a service that is the sole python crawler</a:t>
+              <a:t>On our Ubuntu Server machine, created a service that is the python crawler</a:t>
             </a:r>
             <a:endParaRPr b="1" sz="1600">
               <a:solidFill>
@@ -15986,11 +16912,109 @@
                 <a:cs typeface="Calibri"/>
                 <a:sym typeface="Calibri"/>
               </a:rPr>
-              <a:t>The crawler uses the “schedule” library in Python that runs webscraper for the class schedule every night at midnight</a:t>
+              <a:t>The crawler uses the “schedule” library in Python that runs webscraper for the class schedule every night at midnight.</a:t>
             </a:r>
             <a:endParaRPr b="1" sz="1600">
               <a:solidFill>
                 <a:srgbClr val="FFFF00"/>
+              </a:solidFill>
+              <a:latin typeface="Calibri"/>
+              <a:ea typeface="Calibri"/>
+              <a:cs typeface="Calibri"/>
+              <a:sym typeface="Calibri"/>
+            </a:endParaRPr>
+          </a:p>
+          <a:p>
+            <a:pPr indent="-330200" lvl="2" marL="1371600" marR="0" rtl="0" algn="l">
+              <a:spcBef>
+                <a:spcPts val="0"/>
+              </a:spcBef>
+              <a:spcAft>
+                <a:spcPts val="0"/>
+              </a:spcAft>
+              <a:buClr>
+                <a:srgbClr val="FFFF00"/>
+              </a:buClr>
+              <a:buSzPts val="1600"/>
+              <a:buFont typeface="Calibri"/>
+              <a:buChar char="■"/>
+            </a:pPr>
+            <a:r>
+              <a:rPr b="1" lang="en-US" sz="1600">
+                <a:solidFill>
+                  <a:srgbClr val="FFFF00"/>
+                </a:solidFill>
+                <a:latin typeface="Calibri"/>
+                <a:ea typeface="Calibri"/>
+                <a:cs typeface="Calibri"/>
+                <a:sym typeface="Calibri"/>
+              </a:rPr>
+              <a:t>The schedule was changed to weekly after the drop date as things </a:t>
+            </a:r>
+            <a:r>
+              <a:rPr b="1" lang="en-US" sz="1600">
+                <a:solidFill>
+                  <a:srgbClr val="FFFF00"/>
+                </a:solidFill>
+                <a:latin typeface="Calibri"/>
+                <a:ea typeface="Calibri"/>
+                <a:cs typeface="Calibri"/>
+                <a:sym typeface="Calibri"/>
+              </a:rPr>
+              <a:t>don't</a:t>
+            </a:r>
+            <a:r>
+              <a:rPr b="1" lang="en-US" sz="1600">
+                <a:solidFill>
+                  <a:srgbClr val="FFFF00"/>
+                </a:solidFill>
+                <a:latin typeface="Calibri"/>
+                <a:ea typeface="Calibri"/>
+                <a:cs typeface="Calibri"/>
+                <a:sym typeface="Calibri"/>
+              </a:rPr>
+              <a:t> change much afterwards</a:t>
+            </a:r>
+            <a:endParaRPr b="1" sz="1600">
+              <a:solidFill>
+                <a:srgbClr val="FFFF00"/>
+              </a:solidFill>
+              <a:latin typeface="Calibri"/>
+              <a:ea typeface="Calibri"/>
+              <a:cs typeface="Calibri"/>
+              <a:sym typeface="Calibri"/>
+            </a:endParaRPr>
+          </a:p>
+          <a:p>
+            <a:pPr indent="-330200" lvl="0" marL="457200" marR="0" rtl="0" algn="l">
+              <a:spcBef>
+                <a:spcPts val="0"/>
+              </a:spcBef>
+              <a:spcAft>
+                <a:spcPts val="0"/>
+              </a:spcAft>
+              <a:buClr>
+                <a:srgbClr val="00FFFF"/>
+              </a:buClr>
+              <a:buSzPts val="1600"/>
+              <a:buFont typeface="Calibri"/>
+              <a:buChar char="●"/>
+            </a:pPr>
+            <a:r>
+              <a:rPr b="1" lang="en-US" sz="1600">
+                <a:solidFill>
+                  <a:srgbClr val="00FFFF"/>
+                </a:solidFill>
+                <a:latin typeface="Calibri"/>
+                <a:ea typeface="Calibri"/>
+                <a:cs typeface="Calibri"/>
+                <a:sym typeface="Calibri"/>
+              </a:rPr>
+              <a:t>**Only happened once during data aggregation, not on schedule</a:t>
+            </a:r>
+            <a:endParaRPr b="1" sz="1600">
+              <a:solidFill>
+                <a:srgbClr val="00FFFF"/>
               </a:solidFill>
               <a:latin typeface="Calibri"/>
               <a:ea typeface="Calibri"/>

</xml_diff>